<commit_message>
adding device figures and also mp4
</commit_message>
<xml_diff>
--- a/symposium+defense/idir_symposium_nepal.pptx
+++ b/symposium+defense/idir_symposium_nepal.pptx
@@ -11,8 +11,8 @@
     <p:sldId id="263" r:id="rId2"/>
     <p:sldId id="262" r:id="rId3"/>
     <p:sldId id="264" r:id="rId4"/>
-    <p:sldId id="265" r:id="rId5"/>
-    <p:sldId id="266" r:id="rId6"/>
+    <p:sldId id="266" r:id="rId5"/>
+    <p:sldId id="265" r:id="rId6"/>
     <p:sldId id="267" r:id="rId7"/>
     <p:sldId id="268" r:id="rId8"/>
     <p:sldId id="269" r:id="rId9"/>
@@ -216,7 +216,7 @@
           <a:p>
             <a:fld id="{38D67A11-FE13-46EC-9BBB-0FF54DFE6FC5}" type="datetimeFigureOut">
               <a:rPr lang="de-DE" smtClean="0"/>
-              <a:t>04.09.2024</a:t>
+              <a:t>10.09.2024</a:t>
             </a:fld>
             <a:endParaRPr lang="de-DE"/>
           </a:p>
@@ -481,6 +481,174 @@
     </a:lvl9pPr>
   </p:notesStyle>
 </p:notesMaster>
+</file>
+
+<file path=ppt/notesSlides/notesSlide1.xml><?xml version="1.0" encoding="utf-8"?>
+<p:notes xmlns:a="http://schemas.openxmlformats.org/drawingml/2006/main" xmlns:r="http://schemas.openxmlformats.org/officeDocument/2006/relationships" xmlns:p="http://schemas.openxmlformats.org/presentationml/2006/main">
+  <p:cSld>
+    <p:spTree>
+      <p:nvGrpSpPr>
+        <p:cNvPr id="1" name=""/>
+        <p:cNvGrpSpPr/>
+        <p:nvPr/>
+      </p:nvGrpSpPr>
+      <p:grpSpPr>
+        <a:xfrm>
+          <a:off x="0" y="0"/>
+          <a:ext cx="0" cy="0"/>
+          <a:chOff x="0" y="0"/>
+          <a:chExt cx="0" cy="0"/>
+        </a:xfrm>
+      </p:grpSpPr>
+      <p:sp>
+        <p:nvSpPr>
+          <p:cNvPr id="2" name="Slide Image Placeholder 1"/>
+          <p:cNvSpPr>
+            <a:spLocks noGrp="1" noRot="1" noChangeAspect="1"/>
+          </p:cNvSpPr>
+          <p:nvPr>
+            <p:ph type="sldImg"/>
+          </p:nvPr>
+        </p:nvSpPr>
+        <p:spPr/>
+      </p:sp>
+      <p:sp>
+        <p:nvSpPr>
+          <p:cNvPr id="3" name="Notes Placeholder 2"/>
+          <p:cNvSpPr>
+            <a:spLocks noGrp="1"/>
+          </p:cNvSpPr>
+          <p:nvPr>
+            <p:ph type="body" idx="1"/>
+          </p:nvPr>
+        </p:nvSpPr>
+        <p:spPr/>
+        <p:txBody>
+          <a:bodyPr/>
+          <a:lstStyle/>
+          <a:p>
+            <a:endParaRPr lang="en-150" dirty="0"/>
+          </a:p>
+        </p:txBody>
+      </p:sp>
+      <p:sp>
+        <p:nvSpPr>
+          <p:cNvPr id="4" name="Slide Number Placeholder 3"/>
+          <p:cNvSpPr>
+            <a:spLocks noGrp="1"/>
+          </p:cNvSpPr>
+          <p:nvPr>
+            <p:ph type="sldNum" sz="quarter" idx="5"/>
+          </p:nvPr>
+        </p:nvSpPr>
+        <p:spPr/>
+        <p:txBody>
+          <a:bodyPr/>
+          <a:lstStyle/>
+          <a:p>
+            <a:fld id="{7452B776-650D-443F-99EC-AB9C0CB2CF4A}" type="slidenum">
+              <a:rPr lang="de-DE" smtClean="0"/>
+              <a:t>1</a:t>
+            </a:fld>
+            <a:endParaRPr lang="de-DE"/>
+          </a:p>
+        </p:txBody>
+      </p:sp>
+    </p:spTree>
+    <p:extLst>
+      <p:ext uri="{BB962C8B-B14F-4D97-AF65-F5344CB8AC3E}">
+        <p14:creationId xmlns:p14="http://schemas.microsoft.com/office/powerpoint/2010/main" val="486322889"/>
+      </p:ext>
+    </p:extLst>
+  </p:cSld>
+  <p:clrMapOvr>
+    <a:masterClrMapping/>
+  </p:clrMapOvr>
+</p:notes>
+</file>
+
+<file path=ppt/notesSlides/notesSlide2.xml><?xml version="1.0" encoding="utf-8"?>
+<p:notes xmlns:a="http://schemas.openxmlformats.org/drawingml/2006/main" xmlns:r="http://schemas.openxmlformats.org/officeDocument/2006/relationships" xmlns:p="http://schemas.openxmlformats.org/presentationml/2006/main">
+  <p:cSld>
+    <p:spTree>
+      <p:nvGrpSpPr>
+        <p:cNvPr id="1" name=""/>
+        <p:cNvGrpSpPr/>
+        <p:nvPr/>
+      </p:nvGrpSpPr>
+      <p:grpSpPr>
+        <a:xfrm>
+          <a:off x="0" y="0"/>
+          <a:ext cx="0" cy="0"/>
+          <a:chOff x="0" y="0"/>
+          <a:chExt cx="0" cy="0"/>
+        </a:xfrm>
+      </p:grpSpPr>
+      <p:sp>
+        <p:nvSpPr>
+          <p:cNvPr id="2" name="Slide Image Placeholder 1"/>
+          <p:cNvSpPr>
+            <a:spLocks noGrp="1" noRot="1" noChangeAspect="1"/>
+          </p:cNvSpPr>
+          <p:nvPr>
+            <p:ph type="sldImg"/>
+          </p:nvPr>
+        </p:nvSpPr>
+        <p:spPr/>
+      </p:sp>
+      <p:sp>
+        <p:nvSpPr>
+          <p:cNvPr id="3" name="Notes Placeholder 2"/>
+          <p:cNvSpPr>
+            <a:spLocks noGrp="1"/>
+          </p:cNvSpPr>
+          <p:nvPr>
+            <p:ph type="body" idx="1"/>
+          </p:nvPr>
+        </p:nvSpPr>
+        <p:spPr/>
+        <p:txBody>
+          <a:bodyPr/>
+          <a:lstStyle/>
+          <a:p>
+            <a:endParaRPr lang="en-150" dirty="0"/>
+          </a:p>
+        </p:txBody>
+      </p:sp>
+      <p:sp>
+        <p:nvSpPr>
+          <p:cNvPr id="4" name="Slide Number Placeholder 3"/>
+          <p:cNvSpPr>
+            <a:spLocks noGrp="1"/>
+          </p:cNvSpPr>
+          <p:nvPr>
+            <p:ph type="sldNum" sz="quarter" idx="5"/>
+          </p:nvPr>
+        </p:nvSpPr>
+        <p:spPr/>
+        <p:txBody>
+          <a:bodyPr/>
+          <a:lstStyle/>
+          <a:p>
+            <a:fld id="{7452B776-650D-443F-99EC-AB9C0CB2CF4A}" type="slidenum">
+              <a:rPr lang="de-DE" smtClean="0"/>
+              <a:t>4</a:t>
+            </a:fld>
+            <a:endParaRPr lang="de-DE"/>
+          </a:p>
+        </p:txBody>
+      </p:sp>
+    </p:spTree>
+    <p:extLst>
+      <p:ext uri="{BB962C8B-B14F-4D97-AF65-F5344CB8AC3E}">
+        <p14:creationId xmlns:p14="http://schemas.microsoft.com/office/powerpoint/2010/main" val="3838124844"/>
+      </p:ext>
+    </p:extLst>
+  </p:cSld>
+  <p:clrMapOvr>
+    <a:masterClrMapping/>
+  </p:clrMapOvr>
+</p:notes>
 </file>
 
 <file path=ppt/slideLayouts/slideLayout1.xml><?xml version="1.0" encoding="utf-8"?>
@@ -3875,7 +4043,7 @@
           <a:p>
             <a:fld id="{1A7E03AA-F54C-476B-BA5D-52344C1508FB}" type="datetime1">
               <a:rPr lang="de-DE" smtClean="0"/>
-              <a:t>04.09.2024</a:t>
+              <a:t>10.09.2024</a:t>
             </a:fld>
             <a:endParaRPr lang="de-DE" dirty="0"/>
           </a:p>
@@ -4560,7 +4728,7 @@
           <a:p>
             <a:fld id="{5A90802A-C0FD-4B00-B469-129CF2DA912E}" type="datetime1">
               <a:rPr lang="de-DE" smtClean="0"/>
-              <a:t>04.09.2024</a:t>
+              <a:t>10.09.2024</a:t>
             </a:fld>
             <a:endParaRPr lang="de-DE" dirty="0"/>
           </a:p>
@@ -5510,7 +5678,7 @@
           <a:p>
             <a:fld id="{2979E174-AA4E-4C14-8CD4-2C99030F6972}" type="datetime1">
               <a:rPr lang="de-DE" smtClean="0"/>
-              <a:t>04.09.2024</a:t>
+              <a:t>10.09.2024</a:t>
             </a:fld>
             <a:endParaRPr lang="de-DE" dirty="0"/>
           </a:p>
@@ -6682,7 +6850,10 @@
           <a:bodyPr/>
           <a:lstStyle/>
           <a:p>
-            <a:endParaRPr lang="de-DE" dirty="0"/>
+            <a:r>
+              <a:rPr lang="de-DE" dirty="0"/>
+              <a:t>Knee flexion-extension device </a:t>
+            </a:r>
           </a:p>
         </p:txBody>
       </p:sp>
@@ -6754,6 +6925,78 @@
           </a:p>
         </p:txBody>
       </p:sp>
+      <p:pic>
+        <p:nvPicPr>
+          <p:cNvPr id="9" name="Picture 8" descr="A white and black machine on a table&#10;&#10;Description automatically generated">
+            <a:extLst>
+              <a:ext uri="{FF2B5EF4-FFF2-40B4-BE49-F238E27FC236}">
+                <a16:creationId xmlns:a16="http://schemas.microsoft.com/office/drawing/2014/main" id="{2672704C-CF6F-DCF5-84B2-478B3B00028C}"/>
+              </a:ext>
+            </a:extLst>
+          </p:cNvPr>
+          <p:cNvPicPr>
+            <a:picLocks noChangeAspect="1"/>
+          </p:cNvPicPr>
+          <p:nvPr/>
+        </p:nvPicPr>
+        <p:blipFill>
+          <a:blip r:embed="rId2" cstate="print">
+            <a:extLst>
+              <a:ext uri="{28A0092B-C50C-407E-A947-70E740481C1C}">
+                <a14:useLocalDpi xmlns:a14="http://schemas.microsoft.com/office/drawing/2010/main" val="0"/>
+              </a:ext>
+            </a:extLst>
+          </a:blip>
+          <a:stretch>
+            <a:fillRect/>
+          </a:stretch>
+        </p:blipFill>
+        <p:spPr>
+          <a:xfrm flipH="1">
+            <a:off x="23664" y="843558"/>
+            <a:ext cx="4449656" cy="3055101"/>
+          </a:xfrm>
+          <a:prstGeom prst="rect">
+            <a:avLst/>
+          </a:prstGeom>
+        </p:spPr>
+      </p:pic>
+      <p:pic>
+        <p:nvPicPr>
+          <p:cNvPr id="11" name="Picture 10" descr="A person in a medical gown getting a ct scan&#10;&#10;Description automatically generated">
+            <a:extLst>
+              <a:ext uri="{FF2B5EF4-FFF2-40B4-BE49-F238E27FC236}">
+                <a16:creationId xmlns:a16="http://schemas.microsoft.com/office/drawing/2014/main" id="{B2A9356A-800B-B364-776D-4E81B21FF9EC}"/>
+              </a:ext>
+            </a:extLst>
+          </p:cNvPr>
+          <p:cNvPicPr>
+            <a:picLocks noChangeAspect="1"/>
+          </p:cNvPicPr>
+          <p:nvPr/>
+        </p:nvPicPr>
+        <p:blipFill>
+          <a:blip r:embed="rId3" cstate="print">
+            <a:extLst>
+              <a:ext uri="{28A0092B-C50C-407E-A947-70E740481C1C}">
+                <a14:useLocalDpi xmlns:a14="http://schemas.microsoft.com/office/drawing/2010/main" val="0"/>
+              </a:ext>
+            </a:extLst>
+          </a:blip>
+          <a:stretch>
+            <a:fillRect/>
+          </a:stretch>
+        </p:blipFill>
+        <p:spPr>
+          <a:xfrm>
+            <a:off x="4662371" y="880992"/>
+            <a:ext cx="4481629" cy="3017667"/>
+          </a:xfrm>
+          <a:prstGeom prst="rect">
+            <a:avLst/>
+          </a:prstGeom>
+        </p:spPr>
+      </p:pic>
     </p:spTree>
     <p:extLst>
       <p:ext uri="{BB962C8B-B14F-4D97-AF65-F5344CB8AC3E}">
@@ -6799,7 +7042,10 @@
           <a:bodyPr/>
           <a:lstStyle/>
           <a:p>
-            <a:endParaRPr lang="de-DE" dirty="0"/>
+            <a:r>
+              <a:rPr lang="de-DE" dirty="0"/>
+              <a:t>Reconstructed frames </a:t>
+            </a:r>
           </a:p>
         </p:txBody>
       </p:sp>
@@ -6871,16 +7117,227 @@
           </a:p>
         </p:txBody>
       </p:sp>
+      <p:pic>
+        <p:nvPicPr>
+          <p:cNvPr id="8" name="ds1_animation_high_quality_grayscale">
+            <a:hlinkClick r:id="" action="ppaction://media"/>
+            <a:extLst>
+              <a:ext uri="{FF2B5EF4-FFF2-40B4-BE49-F238E27FC236}">
+                <a16:creationId xmlns:a16="http://schemas.microsoft.com/office/drawing/2014/main" id="{D5064F36-3B18-6461-66F6-70925938ABC8}"/>
+              </a:ext>
+            </a:extLst>
+          </p:cNvPr>
+          <p:cNvPicPr>
+            <a:picLocks noChangeAspect="1"/>
+          </p:cNvPicPr>
+          <p:nvPr>
+            <a:videoFile r:link="rId2"/>
+            <p:extLst>
+              <p:ext uri="{DAA4B4D4-6D71-4841-9C94-3DE7FCFB9230}">
+                <p14:media xmlns:p14="http://schemas.microsoft.com/office/powerpoint/2010/main" r:embed="rId1"/>
+              </p:ext>
+            </p:extLst>
+          </p:nvPr>
+        </p:nvPicPr>
+        <p:blipFill>
+          <a:blip r:embed="rId5"/>
+          <a:srcRect l="24070" r="28021"/>
+          <a:stretch/>
+        </p:blipFill>
+        <p:spPr>
+          <a:xfrm>
+            <a:off x="6263680" y="627534"/>
+            <a:ext cx="2880320" cy="4246512"/>
+          </a:xfrm>
+          <a:prstGeom prst="rect">
+            <a:avLst/>
+          </a:prstGeom>
+        </p:spPr>
+      </p:pic>
+      <p:pic>
+        <p:nvPicPr>
+          <p:cNvPr id="10" name="Picture 9" descr="A close-up of x-ray images&#10;&#10;Description automatically generated">
+            <a:extLst>
+              <a:ext uri="{FF2B5EF4-FFF2-40B4-BE49-F238E27FC236}">
+                <a16:creationId xmlns:a16="http://schemas.microsoft.com/office/drawing/2014/main" id="{AF777D22-FD43-9826-FA8D-FAD930DA3A97}"/>
+              </a:ext>
+            </a:extLst>
+          </p:cNvPr>
+          <p:cNvPicPr>
+            <a:picLocks noChangeAspect="1"/>
+          </p:cNvPicPr>
+          <p:nvPr/>
+        </p:nvPicPr>
+        <p:blipFill>
+          <a:blip r:embed="rId6">
+            <a:extLst>
+              <a:ext uri="{28A0092B-C50C-407E-A947-70E740481C1C}">
+                <a14:useLocalDpi xmlns:a14="http://schemas.microsoft.com/office/drawing/2010/main" val="0"/>
+              </a:ext>
+            </a:extLst>
+          </a:blip>
+          <a:stretch>
+            <a:fillRect/>
+          </a:stretch>
+        </p:blipFill>
+        <p:spPr>
+          <a:xfrm>
+            <a:off x="539552" y="771550"/>
+            <a:ext cx="5486664" cy="3657776"/>
+          </a:xfrm>
+          <a:prstGeom prst="rect">
+            <a:avLst/>
+          </a:prstGeom>
+        </p:spPr>
+      </p:pic>
     </p:spTree>
     <p:extLst>
       <p:ext uri="{BB962C8B-B14F-4D97-AF65-F5344CB8AC3E}">
-        <p14:creationId xmlns:p14="http://schemas.microsoft.com/office/powerpoint/2010/main" val="411014032"/>
+        <p14:creationId xmlns:p14="http://schemas.microsoft.com/office/powerpoint/2010/main" val="3833344239"/>
       </p:ext>
     </p:extLst>
   </p:cSld>
   <p:clrMapOvr>
     <a:masterClrMapping/>
   </p:clrMapOvr>
+  <p:timing>
+    <p:tnLst>
+      <p:par>
+        <p:cTn id="1" dur="indefinite" restart="never" nodeType="tmRoot">
+          <p:childTnLst>
+            <p:seq concurrent="1" nextAc="seek">
+              <p:cTn id="2" dur="indefinite" nodeType="mainSeq">
+                <p:childTnLst>
+                  <p:par>
+                    <p:cTn id="3" fill="hold">
+                      <p:stCondLst>
+                        <p:cond delay="indefinite"/>
+                        <p:cond evt="onBegin" delay="0">
+                          <p:tn val="2"/>
+                        </p:cond>
+                      </p:stCondLst>
+                      <p:childTnLst>
+                        <p:par>
+                          <p:cTn id="4" fill="hold">
+                            <p:stCondLst>
+                              <p:cond delay="0"/>
+                            </p:stCondLst>
+                            <p:childTnLst>
+                              <p:par>
+                                <p:cTn id="5" presetID="1" presetClass="mediacall" presetSubtype="0" fill="hold" nodeType="afterEffect">
+                                  <p:stCondLst>
+                                    <p:cond delay="0"/>
+                                  </p:stCondLst>
+                                  <p:childTnLst>
+                                    <p:cmd type="call" cmd="playFrom(0.0)">
+                                      <p:cBhvr>
+                                        <p:cTn id="6" dur="1960" fill="hold"/>
+                                        <p:tgtEl>
+                                          <p:spTgt spid="8"/>
+                                        </p:tgtEl>
+                                      </p:cBhvr>
+                                    </p:cmd>
+                                  </p:childTnLst>
+                                </p:cTn>
+                              </p:par>
+                            </p:childTnLst>
+                          </p:cTn>
+                        </p:par>
+                      </p:childTnLst>
+                    </p:cTn>
+                  </p:par>
+                </p:childTnLst>
+              </p:cTn>
+              <p:prevCondLst>
+                <p:cond evt="onPrev" delay="0">
+                  <p:tgtEl>
+                    <p:sldTgt/>
+                  </p:tgtEl>
+                </p:cond>
+              </p:prevCondLst>
+              <p:nextCondLst>
+                <p:cond evt="onNext" delay="0">
+                  <p:tgtEl>
+                    <p:sldTgt/>
+                  </p:tgtEl>
+                </p:cond>
+              </p:nextCondLst>
+            </p:seq>
+            <p:video>
+              <p:cMediaNode vol="80000">
+                <p:cTn id="7" repeatCount="indefinite" fill="hold" display="0">
+                  <p:stCondLst>
+                    <p:cond delay="indefinite"/>
+                  </p:stCondLst>
+                </p:cTn>
+                <p:tgtEl>
+                  <p:spTgt spid="8"/>
+                </p:tgtEl>
+              </p:cMediaNode>
+            </p:video>
+            <p:seq concurrent="1" nextAc="seek">
+              <p:cTn id="8" restart="whenNotActive" fill="hold" evtFilter="cancelBubble" nodeType="interactiveSeq">
+                <p:stCondLst>
+                  <p:cond evt="onClick" delay="0">
+                    <p:tgtEl>
+                      <p:spTgt spid="8"/>
+                    </p:tgtEl>
+                  </p:cond>
+                </p:stCondLst>
+                <p:endSync evt="end" delay="0">
+                  <p:rtn val="all"/>
+                </p:endSync>
+                <p:childTnLst>
+                  <p:par>
+                    <p:cTn id="9" fill="hold">
+                      <p:stCondLst>
+                        <p:cond delay="0"/>
+                      </p:stCondLst>
+                      <p:childTnLst>
+                        <p:par>
+                          <p:cTn id="10" fill="hold">
+                            <p:stCondLst>
+                              <p:cond delay="0"/>
+                            </p:stCondLst>
+                            <p:childTnLst>
+                              <p:par>
+                                <p:cTn id="11" presetID="2" presetClass="mediacall" presetSubtype="0" fill="hold" nodeType="clickEffect">
+                                  <p:stCondLst>
+                                    <p:cond delay="0"/>
+                                  </p:stCondLst>
+                                  <p:childTnLst>
+                                    <p:cmd type="call" cmd="togglePause">
+                                      <p:cBhvr>
+                                        <p:cTn id="12" dur="1" fill="hold"/>
+                                        <p:tgtEl>
+                                          <p:spTgt spid="8"/>
+                                        </p:tgtEl>
+                                      </p:cBhvr>
+                                    </p:cmd>
+                                  </p:childTnLst>
+                                </p:cTn>
+                              </p:par>
+                            </p:childTnLst>
+                          </p:cTn>
+                        </p:par>
+                      </p:childTnLst>
+                    </p:cTn>
+                  </p:par>
+                </p:childTnLst>
+              </p:cTn>
+              <p:nextCondLst>
+                <p:cond evt="onClick" delay="0">
+                  <p:tgtEl>
+                    <p:spTgt spid="8"/>
+                  </p:tgtEl>
+                </p:cond>
+              </p:nextCondLst>
+            </p:seq>
+          </p:childTnLst>
+        </p:cTn>
+      </p:par>
+    </p:tnLst>
+  </p:timing>
 </p:sld>
 </file>
 
@@ -6991,7 +7448,7 @@
     </p:spTree>
     <p:extLst>
       <p:ext uri="{BB962C8B-B14F-4D97-AF65-F5344CB8AC3E}">
-        <p14:creationId xmlns:p14="http://schemas.microsoft.com/office/powerpoint/2010/main" val="3833344239"/>
+        <p14:creationId xmlns:p14="http://schemas.microsoft.com/office/powerpoint/2010/main" val="411014032"/>
       </p:ext>
     </p:extLst>
   </p:cSld>

</xml_diff>

<commit_message>
added some figures to methods
</commit_message>
<xml_diff>
--- a/symposium+defense/idir_symposium_nepal.pptx
+++ b/symposium+defense/idir_symposium_nepal.pptx
@@ -5,7 +5,7 @@
     <p:sldMasterId id="2147483648" r:id="rId1"/>
   </p:sldMasterIdLst>
   <p:notesMasterIdLst>
-    <p:notesMasterId r:id="rId11"/>
+    <p:notesMasterId r:id="rId12"/>
   </p:notesMasterIdLst>
   <p:sldIdLst>
     <p:sldId id="263" r:id="rId2"/>
@@ -13,10 +13,11 @@
     <p:sldId id="264" r:id="rId4"/>
     <p:sldId id="266" r:id="rId5"/>
     <p:sldId id="265" r:id="rId6"/>
-    <p:sldId id="267" r:id="rId7"/>
-    <p:sldId id="268" r:id="rId8"/>
-    <p:sldId id="269" r:id="rId9"/>
-    <p:sldId id="270" r:id="rId10"/>
+    <p:sldId id="271" r:id="rId7"/>
+    <p:sldId id="267" r:id="rId8"/>
+    <p:sldId id="268" r:id="rId9"/>
+    <p:sldId id="269" r:id="rId10"/>
+    <p:sldId id="270" r:id="rId11"/>
   </p:sldIdLst>
   <p:sldSz cx="9144000" cy="5143500" type="screen16x9"/>
   <p:notesSz cx="6858000" cy="9144000"/>
@@ -6698,6 +6699,123 @@
 </p:sld>
 </file>
 
+<file path=ppt/slides/slide10.xml><?xml version="1.0" encoding="utf-8"?>
+<p:sld xmlns:a="http://schemas.openxmlformats.org/drawingml/2006/main" xmlns:r="http://schemas.openxmlformats.org/officeDocument/2006/relationships" xmlns:p="http://schemas.openxmlformats.org/presentationml/2006/main">
+  <p:cSld>
+    <p:spTree>
+      <p:nvGrpSpPr>
+        <p:cNvPr id="1" name=""/>
+        <p:cNvGrpSpPr/>
+        <p:nvPr/>
+      </p:nvGrpSpPr>
+      <p:grpSpPr>
+        <a:xfrm>
+          <a:off x="0" y="0"/>
+          <a:ext cx="0" cy="0"/>
+          <a:chOff x="0" y="0"/>
+          <a:chExt cx="0" cy="0"/>
+        </a:xfrm>
+      </p:grpSpPr>
+      <p:sp>
+        <p:nvSpPr>
+          <p:cNvPr id="2" name="Titel 1"/>
+          <p:cNvSpPr>
+            <a:spLocks noGrp="1"/>
+          </p:cNvSpPr>
+          <p:nvPr>
+            <p:ph type="title"/>
+          </p:nvPr>
+        </p:nvSpPr>
+        <p:spPr/>
+        <p:txBody>
+          <a:bodyPr/>
+          <a:lstStyle/>
+          <a:p>
+            <a:endParaRPr lang="de-DE" dirty="0"/>
+          </a:p>
+        </p:txBody>
+      </p:sp>
+      <p:sp>
+        <p:nvSpPr>
+          <p:cNvPr id="3" name="Datumsplatzhalter 2"/>
+          <p:cNvSpPr>
+            <a:spLocks noGrp="1"/>
+          </p:cNvSpPr>
+          <p:nvPr>
+            <p:ph type="dt" sz="half" idx="10"/>
+          </p:nvPr>
+        </p:nvSpPr>
+        <p:spPr/>
+        <p:txBody>
+          <a:bodyPr/>
+          <a:lstStyle/>
+          <a:p>
+            <a:r>
+              <a:rPr lang="de-DE" dirty="0"/>
+              <a:t>12.09.2024</a:t>
+            </a:r>
+          </a:p>
+        </p:txBody>
+      </p:sp>
+      <p:sp>
+        <p:nvSpPr>
+          <p:cNvPr id="4" name="Fußzeilenplatzhalter 3"/>
+          <p:cNvSpPr>
+            <a:spLocks noGrp="1"/>
+          </p:cNvSpPr>
+          <p:nvPr>
+            <p:ph type="ftr" sz="quarter" idx="3"/>
+          </p:nvPr>
+        </p:nvSpPr>
+        <p:spPr/>
+        <p:txBody>
+          <a:bodyPr/>
+          <a:lstStyle/>
+          <a:p>
+            <a:r>
+              <a:rPr lang="de-DE" dirty="0"/>
+              <a:t>Aayush Nepal </a:t>
+            </a:r>
+          </a:p>
+        </p:txBody>
+      </p:sp>
+      <p:sp>
+        <p:nvSpPr>
+          <p:cNvPr id="5" name="Foliennummernplatzhalter 4"/>
+          <p:cNvSpPr>
+            <a:spLocks noGrp="1"/>
+          </p:cNvSpPr>
+          <p:nvPr>
+            <p:ph type="sldNum" sz="quarter" idx="4"/>
+          </p:nvPr>
+        </p:nvSpPr>
+        <p:spPr/>
+        <p:txBody>
+          <a:bodyPr/>
+          <a:lstStyle/>
+          <a:p>
+            <a:fld id="{50B1B3AD-80CD-4C4C-B9E6-D3174EA9BC3B}" type="slidenum">
+              <a:rPr lang="de-DE" smtClean="0"/>
+              <a:pPr/>
+              <a:t>10</a:t>
+            </a:fld>
+            <a:endParaRPr lang="de-DE" dirty="0"/>
+          </a:p>
+        </p:txBody>
+      </p:sp>
+    </p:spTree>
+    <p:extLst>
+      <p:ext uri="{BB962C8B-B14F-4D97-AF65-F5344CB8AC3E}">
+        <p14:creationId xmlns:p14="http://schemas.microsoft.com/office/powerpoint/2010/main" val="2778688522"/>
+      </p:ext>
+    </p:extLst>
+  </p:cSld>
+  <p:clrMapOvr>
+    <a:masterClrMapping/>
+  </p:clrMapOvr>
+</p:sld>
+</file>
+
 <file path=ppt/slides/slide2.xml><?xml version="1.0" encoding="utf-8"?>
 <p:sld xmlns:a="http://schemas.openxmlformats.org/drawingml/2006/main" xmlns:r="http://schemas.openxmlformats.org/officeDocument/2006/relationships" xmlns:p="http://schemas.openxmlformats.org/presentationml/2006/main">
   <p:cSld>
@@ -7373,7 +7491,10 @@
           <a:bodyPr/>
           <a:lstStyle/>
           <a:p>
-            <a:endParaRPr lang="de-DE" dirty="0"/>
+            <a:r>
+              <a:rPr lang="de-DE" dirty="0"/>
+              <a:t>Methods</a:t>
+            </a:r>
           </a:p>
         </p:txBody>
       </p:sp>
@@ -7445,6 +7566,77 @@
           </a:p>
         </p:txBody>
       </p:sp>
+      <p:pic>
+        <p:nvPicPr>
+          <p:cNvPr id="7" name="Picture 6" descr="A close up of a hand&#10;&#10;Description automatically generated">
+            <a:extLst>
+              <a:ext uri="{FF2B5EF4-FFF2-40B4-BE49-F238E27FC236}">
+                <a16:creationId xmlns:a16="http://schemas.microsoft.com/office/drawing/2014/main" id="{62819011-0159-5616-BBC6-4E2B01D55164}"/>
+              </a:ext>
+            </a:extLst>
+          </p:cNvPr>
+          <p:cNvPicPr>
+            <a:picLocks noChangeAspect="1"/>
+          </p:cNvPicPr>
+          <p:nvPr/>
+        </p:nvPicPr>
+        <p:blipFill>
+          <a:blip r:embed="rId2">
+            <a:extLst>
+              <a:ext uri="{28A0092B-C50C-407E-A947-70E740481C1C}">
+                <a14:useLocalDpi xmlns:a14="http://schemas.microsoft.com/office/drawing/2010/main" val="0"/>
+              </a:ext>
+            </a:extLst>
+          </a:blip>
+          <a:stretch>
+            <a:fillRect/>
+          </a:stretch>
+        </p:blipFill>
+        <p:spPr>
+          <a:xfrm>
+            <a:off x="1763688" y="918932"/>
+            <a:ext cx="2248214" cy="3305636"/>
+          </a:xfrm>
+          <a:prstGeom prst="rect">
+            <a:avLst/>
+          </a:prstGeom>
+        </p:spPr>
+      </p:pic>
+      <p:pic>
+        <p:nvPicPr>
+          <p:cNvPr id="9" name="Picture 8" descr="A black and white image of a human body&#10;&#10;Description automatically generated">
+            <a:extLst>
+              <a:ext uri="{FF2B5EF4-FFF2-40B4-BE49-F238E27FC236}">
+                <a16:creationId xmlns:a16="http://schemas.microsoft.com/office/drawing/2014/main" id="{B10305EF-32E1-5891-68D6-4035F2FA57C7}"/>
+              </a:ext>
+            </a:extLst>
+          </p:cNvPr>
+          <p:cNvPicPr>
+            <a:picLocks noChangeAspect="1"/>
+          </p:cNvPicPr>
+          <p:nvPr/>
+        </p:nvPicPr>
+        <p:blipFill>
+          <a:blip r:embed="rId3" cstate="print">
+            <a:extLst>
+              <a:ext uri="{28A0092B-C50C-407E-A947-70E740481C1C}">
+                <a14:useLocalDpi xmlns:a14="http://schemas.microsoft.com/office/drawing/2010/main" val="0"/>
+              </a:ext>
+            </a:extLst>
+          </a:blip>
+          <a:srcRect l="24999" r="27633"/>
+          <a:stretch/>
+        </p:blipFill>
+        <p:spPr>
+          <a:xfrm>
+            <a:off x="5436096" y="918932"/>
+            <a:ext cx="2248214" cy="3305636"/>
+          </a:xfrm>
+          <a:prstGeom prst="rect">
+            <a:avLst/>
+          </a:prstGeom>
+        </p:spPr>
+      </p:pic>
     </p:spTree>
     <p:extLst>
       <p:ext uri="{BB962C8B-B14F-4D97-AF65-F5344CB8AC3E}">
@@ -7490,7 +7682,10 @@
           <a:bodyPr/>
           <a:lstStyle/>
           <a:p>
-            <a:endParaRPr lang="de-DE" dirty="0"/>
+            <a:r>
+              <a:rPr lang="de-DE" dirty="0"/>
+              <a:t>Methods</a:t>
+            </a:r>
           </a:p>
         </p:txBody>
       </p:sp>
@@ -7562,10 +7757,81 @@
           </a:p>
         </p:txBody>
       </p:sp>
+      <p:pic>
+        <p:nvPicPr>
+          <p:cNvPr id="9" name="Picture 8" descr="A black and white image of a human body&#10;&#10;Description automatically generated">
+            <a:extLst>
+              <a:ext uri="{FF2B5EF4-FFF2-40B4-BE49-F238E27FC236}">
+                <a16:creationId xmlns:a16="http://schemas.microsoft.com/office/drawing/2014/main" id="{B10305EF-32E1-5891-68D6-4035F2FA57C7}"/>
+              </a:ext>
+            </a:extLst>
+          </p:cNvPr>
+          <p:cNvPicPr>
+            <a:picLocks noChangeAspect="1"/>
+          </p:cNvPicPr>
+          <p:nvPr/>
+        </p:nvPicPr>
+        <p:blipFill>
+          <a:blip r:embed="rId2" cstate="print">
+            <a:extLst>
+              <a:ext uri="{28A0092B-C50C-407E-A947-70E740481C1C}">
+                <a14:useLocalDpi xmlns:a14="http://schemas.microsoft.com/office/drawing/2010/main" val="0"/>
+              </a:ext>
+            </a:extLst>
+          </a:blip>
+          <a:srcRect l="24999" r="27633"/>
+          <a:stretch/>
+        </p:blipFill>
+        <p:spPr>
+          <a:xfrm>
+            <a:off x="5436096" y="918932"/>
+            <a:ext cx="2248214" cy="3305636"/>
+          </a:xfrm>
+          <a:prstGeom prst="rect">
+            <a:avLst/>
+          </a:prstGeom>
+        </p:spPr>
+      </p:pic>
+      <p:pic>
+        <p:nvPicPr>
+          <p:cNvPr id="11" name="Picture 10" descr="A black background with colorful lines&#10;&#10;Description automatically generated">
+            <a:extLst>
+              <a:ext uri="{FF2B5EF4-FFF2-40B4-BE49-F238E27FC236}">
+                <a16:creationId xmlns:a16="http://schemas.microsoft.com/office/drawing/2014/main" id="{98E0BC17-019F-FEF0-2D0C-C680BEEB1ABF}"/>
+              </a:ext>
+            </a:extLst>
+          </p:cNvPr>
+          <p:cNvPicPr>
+            <a:picLocks noChangeAspect="1"/>
+          </p:cNvPicPr>
+          <p:nvPr/>
+        </p:nvPicPr>
+        <p:blipFill>
+          <a:blip r:embed="rId3" cstate="print">
+            <a:alphaModFix/>
+            <a:extLst>
+              <a:ext uri="{28A0092B-C50C-407E-A947-70E740481C1C}">
+                <a14:useLocalDpi xmlns:a14="http://schemas.microsoft.com/office/drawing/2010/main" val="0"/>
+              </a:ext>
+            </a:extLst>
+          </a:blip>
+          <a:srcRect l="20253" r="35443"/>
+          <a:stretch/>
+        </p:blipFill>
+        <p:spPr>
+          <a:xfrm>
+            <a:off x="1763688" y="904997"/>
+            <a:ext cx="2248214" cy="3333505"/>
+          </a:xfrm>
+          <a:prstGeom prst="rect">
+            <a:avLst/>
+          </a:prstGeom>
+        </p:spPr>
+      </p:pic>
     </p:spTree>
     <p:extLst>
       <p:ext uri="{BB962C8B-B14F-4D97-AF65-F5344CB8AC3E}">
-        <p14:creationId xmlns:p14="http://schemas.microsoft.com/office/powerpoint/2010/main" val="3714980917"/>
+        <p14:creationId xmlns:p14="http://schemas.microsoft.com/office/powerpoint/2010/main" val="1476918818"/>
       </p:ext>
     </p:extLst>
   </p:cSld>
@@ -7682,7 +7948,7 @@
     </p:spTree>
     <p:extLst>
       <p:ext uri="{BB962C8B-B14F-4D97-AF65-F5344CB8AC3E}">
-        <p14:creationId xmlns:p14="http://schemas.microsoft.com/office/powerpoint/2010/main" val="2119421583"/>
+        <p14:creationId xmlns:p14="http://schemas.microsoft.com/office/powerpoint/2010/main" val="3714980917"/>
       </p:ext>
     </p:extLst>
   </p:cSld>
@@ -7799,7 +8065,7 @@
     </p:spTree>
     <p:extLst>
       <p:ext uri="{BB962C8B-B14F-4D97-AF65-F5344CB8AC3E}">
-        <p14:creationId xmlns:p14="http://schemas.microsoft.com/office/powerpoint/2010/main" val="3749444034"/>
+        <p14:creationId xmlns:p14="http://schemas.microsoft.com/office/powerpoint/2010/main" val="2119421583"/>
       </p:ext>
     </p:extLst>
   </p:cSld>
@@ -7916,7 +8182,7 @@
     </p:spTree>
     <p:extLst>
       <p:ext uri="{BB962C8B-B14F-4D97-AF65-F5344CB8AC3E}">
-        <p14:creationId xmlns:p14="http://schemas.microsoft.com/office/powerpoint/2010/main" val="2778688522"/>
+        <p14:creationId xmlns:p14="http://schemas.microsoft.com/office/powerpoint/2010/main" val="3749444034"/>
       </p:ext>
     </p:extLst>
   </p:cSld>

</xml_diff>